<commit_message>
committed mockup of dataset
</commit_message>
<xml_diff>
--- a/ANITA_WP5_T5.1 - JADS - SitRep.pptx
+++ b/ANITA_WP5_T5.1 - JADS - SitRep.pptx
@@ -222,7 +222,7 @@
           <a:p>
             <a:fld id="{3032BA57-DC32-4F4F-A2BB-B0927F85FBB7}" type="datetimeFigureOut">
               <a:rPr lang="en-US" smtClean="0"/>
-              <a:t>11/20/18</a:t>
+              <a:t>11/26/18</a:t>
             </a:fld>
             <a:endParaRPr lang="en-US"/>
           </a:p>
@@ -8202,7 +8202,12 @@
             <p:ph idx="1"/>
           </p:nvPr>
         </p:nvSpPr>
-        <p:spPr/>
+        <p:spPr>
+          <a:xfrm>
+            <a:off x="735062" y="2366716"/>
+            <a:ext cx="9221689" cy="4442242"/>
+          </a:xfrm>
+        </p:spPr>
         <p:txBody>
           <a:bodyPr>
             <a:normAutofit lnSpcReduction="10000"/>
@@ -10635,7 +10640,7 @@
         </p:blipFill>
         <p:spPr>
           <a:xfrm>
-            <a:off x="0" y="2347130"/>
+            <a:off x="495" y="2256598"/>
             <a:ext cx="10691813" cy="5212545"/>
           </a:xfrm>
           <a:prstGeom prst="rect">

</xml_diff>